<commit_message>
Aligning dropBox and Git
There were some inconsistencies between the two that this update fixes.
</commit_message>
<xml_diff>
--- a/Laboratory Latex/Lab09Datapath/LMS Upload Lab09/Lab09.pptx
+++ b/Laboratory Latex/Lab09Datapath/LMS Upload Lab09/Lab09.pptx
@@ -212,7 +212,7 @@
           <a:p>
             <a:fld id="{E4DD5C9C-88A3-CA43-B162-DCC4E1E4BE7D}" type="datetimeFigureOut">
               <a:rPr lang="en-US" smtClean="0"/>
-              <a:t>4/16/2024</a:t>
+              <a:t>4/22/2025</a:t>
             </a:fld>
             <a:endParaRPr lang="en-US"/>
           </a:p>
@@ -377,7 +377,7 @@
           <a:p>
             <a:fld id="{BC5E4000-89B6-4F22-834E-B172C4AA57D1}" type="datetimeFigureOut">
               <a:rPr lang="en-US" smtClean="0"/>
-              <a:t>4/16/2024</a:t>
+              <a:t>4/22/2025</a:t>
             </a:fld>
             <a:endParaRPr lang="en-US"/>
           </a:p>
@@ -1605,7 +1605,7 @@
           <a:p>
             <a:fld id="{8923E60E-3077-9A4D-B784-FBCD6B1A2E3F}" type="datetimeFigureOut">
               <a:rPr lang="en-US" smtClean="0"/>
-              <a:t>4/16/2024</a:t>
+              <a:t>4/22/2025</a:t>
             </a:fld>
             <a:endParaRPr lang="en-US"/>
           </a:p>
@@ -2221,7 +2221,7 @@
           <a:p>
             <a:fld id="{8923E60E-3077-9A4D-B784-FBCD6B1A2E3F}" type="datetimeFigureOut">
               <a:rPr lang="en-US" smtClean="0"/>
-              <a:t>4/16/2024</a:t>
+              <a:t>4/22/2025</a:t>
             </a:fld>
             <a:endParaRPr lang="en-US"/>
           </a:p>
@@ -2698,7 +2698,7 @@
           <a:p>
             <a:fld id="{8923E60E-3077-9A4D-B784-FBCD6B1A2E3F}" type="datetimeFigureOut">
               <a:rPr lang="en-US" smtClean="0"/>
-              <a:t>4/16/2024</a:t>
+              <a:t>4/22/2025</a:t>
             </a:fld>
             <a:endParaRPr lang="en-US"/>
           </a:p>
@@ -2935,7 +2935,7 @@
           <a:p>
             <a:fld id="{8923E60E-3077-9A4D-B784-FBCD6B1A2E3F}" type="datetimeFigureOut">
               <a:rPr lang="en-US" smtClean="0"/>
-              <a:t>4/16/2024</a:t>
+              <a:t>4/22/2025</a:t>
             </a:fld>
             <a:endParaRPr lang="en-US"/>
           </a:p>
@@ -3290,7 +3290,7 @@
           <a:p>
             <a:fld id="{8923E60E-3077-9A4D-B784-FBCD6B1A2E3F}" type="datetimeFigureOut">
               <a:rPr lang="en-US" smtClean="0"/>
-              <a:t>4/16/2024</a:t>
+              <a:t>4/22/2025</a:t>
             </a:fld>
             <a:endParaRPr lang="en-US"/>
           </a:p>
@@ -3757,7 +3757,7 @@
           <a:p>
             <a:fld id="{8923E60E-3077-9A4D-B784-FBCD6B1A2E3F}" type="datetimeFigureOut">
               <a:rPr lang="en-US" smtClean="0"/>
-              <a:t>4/16/2024</a:t>
+              <a:t>4/22/2025</a:t>
             </a:fld>
             <a:endParaRPr lang="en-US"/>
           </a:p>
@@ -4102,7 +4102,7 @@
           <a:p>
             <a:fld id="{8923E60E-3077-9A4D-B784-FBCD6B1A2E3F}" type="datetimeFigureOut">
               <a:rPr lang="en-US" smtClean="0"/>
-              <a:t>4/16/2024</a:t>
+              <a:t>4/22/2025</a:t>
             </a:fld>
             <a:endParaRPr lang="en-US"/>
           </a:p>
@@ -4459,7 +4459,7 @@
           <a:p>
             <a:fld id="{8923E60E-3077-9A4D-B784-FBCD6B1A2E3F}" type="datetimeFigureOut">
               <a:rPr lang="en-US" smtClean="0"/>
-              <a:t>4/16/2024</a:t>
+              <a:t>4/22/2025</a:t>
             </a:fld>
             <a:endParaRPr lang="en-US"/>
           </a:p>
@@ -5000,7 +5000,7 @@
           <a:p>
             <a:fld id="{8923E60E-3077-9A4D-B784-FBCD6B1A2E3F}" type="datetimeFigureOut">
               <a:rPr lang="en-US" smtClean="0"/>
-              <a:t>4/16/2024</a:t>
+              <a:t>4/22/2025</a:t>
             </a:fld>
             <a:endParaRPr lang="en-US"/>
           </a:p>
@@ -5294,7 +5294,7 @@
           <a:p>
             <a:fld id="{8923E60E-3077-9A4D-B784-FBCD6B1A2E3F}" type="datetimeFigureOut">
               <a:rPr lang="en-US" smtClean="0"/>
-              <a:t>4/16/2024</a:t>
+              <a:t>4/22/2025</a:t>
             </a:fld>
             <a:endParaRPr lang="en-US"/>
           </a:p>
@@ -5558,7 +5558,7 @@
           <a:p>
             <a:fld id="{8923E60E-3077-9A4D-B784-FBCD6B1A2E3F}" type="datetimeFigureOut">
               <a:rPr lang="en-US" smtClean="0"/>
-              <a:t>4/16/2024</a:t>
+              <a:t>4/22/2025</a:t>
             </a:fld>
             <a:endParaRPr lang="en-US"/>
           </a:p>
@@ -7744,7 +7744,12 @@
             <p:ph type="title"/>
           </p:nvPr>
         </p:nvSpPr>
-        <p:spPr/>
+        <p:spPr>
+          <a:xfrm>
+            <a:off x="730135" y="242993"/>
+            <a:ext cx="10515600" cy="993036"/>
+          </a:xfrm>
+        </p:spPr>
         <p:txBody>
           <a:bodyPr/>
           <a:lstStyle/>
@@ -7770,7 +7775,7 @@
             <p:ph idx="1"/>
             <p:extLst>
               <p:ext uri="{D42A27DB-BD31-4B8C-83A1-F6EECF244321}">
-                <p14:modId xmlns:p14="http://schemas.microsoft.com/office/powerpoint/2010/main" val="1392310923"/>
+                <p14:modId xmlns:p14="http://schemas.microsoft.com/office/powerpoint/2010/main" val="54181353"/>
               </p:ext>
             </p:extLst>
           </p:nvPr>
@@ -9582,12 +9587,12 @@
                         </a:spcAft>
                       </a:pPr>
                       <a:r>
-                        <a:rPr lang="en-US" sz="1100">
+                        <a:rPr lang="en-US" sz="1100" dirty="0">
                           <a:effectLst/>
                         </a:rPr>
-                        <a:t> </a:t>
+                        <a:t> 1</a:t>
                       </a:r>
-                      <a:endParaRPr lang="en-US" sz="1100">
+                      <a:endParaRPr lang="en-US" sz="1100" dirty="0">
                         <a:effectLst/>
                         <a:latin typeface="Times New Roman" panose="02020603050405020304" pitchFamily="18" charset="0"/>
                         <a:ea typeface="SimSun" panose="02010600030101010101" pitchFamily="2" charset="-122"/>
@@ -10289,12 +10294,8 @@
           <a:lstStyle/>
           <a:p>
             <a:r>
-              <a:rPr lang="en-US"/>
-              <a:t>RUN state    Run </a:t>
-            </a:r>
-            <a:r>
-              <a:rPr lang="en-US" dirty="0"/>
-              <a:t>internal timer and update displayed time</a:t>
+              <a:rPr lang="en-US" dirty="0"/>
+              <a:t>RUN state    Run internal timer and update displayed time</a:t>
             </a:r>
           </a:p>
           <a:p>
@@ -10430,7 +10431,7 @@
           <a:p>
             <a:r>
               <a:rPr lang="en-US" dirty="0"/>
-              <a:t>Download “datapathLab10_tbWaveSetup.do” into the: &lt;</a:t>
+              <a:t>Download “datapath_tbWaveSetup.do” into the: &lt;</a:t>
             </a:r>
             <a:r>
               <a:rPr lang="en-US" dirty="0" err="1"/>
@@ -10460,7 +10461,7 @@
           <a:p>
             <a:r>
               <a:rPr lang="en-US" dirty="0"/>
-              <a:t>Edit datapathLab10_tbWaveSetup.do file using Notepad. </a:t>
+              <a:t>Edit datapath_tbWaveSetup.do file using Notepad. </a:t>
             </a:r>
           </a:p>
           <a:p>
@@ -10472,7 +10473,7 @@
           <a:p>
             <a:r>
               <a:rPr lang="en-US" dirty="0"/>
-              <a:t>VSIM 3&gt; do datapathLab10_tbWaveSetup.do </a:t>
+              <a:t>VSIM 3&gt; do datapath_tbWaveSetup.do </a:t>
             </a:r>
           </a:p>
           <a:p>

</xml_diff>